<commit_message>
more buttons and sounds
</commit_message>
<xml_diff>
--- a/ton_soundboard/static/editing buttons.pptx
+++ b/ton_soundboard/static/editing buttons.pptx
@@ -10,6 +10,14 @@
     <p:sldId id="258" r:id="rId4"/>
     <p:sldId id="259" r:id="rId5"/>
     <p:sldId id="260" r:id="rId6"/>
+    <p:sldId id="263" r:id="rId7"/>
+    <p:sldId id="267" r:id="rId8"/>
+    <p:sldId id="268" r:id="rId9"/>
+    <p:sldId id="269" r:id="rId10"/>
+    <p:sldId id="270" r:id="rId11"/>
+    <p:sldId id="271" r:id="rId12"/>
+    <p:sldId id="272" r:id="rId13"/>
+    <p:sldId id="273" r:id="rId14"/>
   </p:sldIdLst>
   <p:sldSz cx="12192000" cy="6858000"/>
   <p:notesSz cx="6858000" cy="9144000"/>
@@ -247,7 +255,7 @@
           <a:p>
             <a:fld id="{554CE385-AC8C-4CCE-A06B-FC5283D44AAA}" type="datetimeFigureOut">
               <a:rPr lang="he-IL" smtClean="0"/>
-              <a:t>ב'/תשרי/תשפ"א</a:t>
+              <a:t>ו'/תשרי/תשפ"א</a:t>
             </a:fld>
             <a:endParaRPr lang="he-IL"/>
           </a:p>
@@ -417,7 +425,7 @@
           <a:p>
             <a:fld id="{554CE385-AC8C-4CCE-A06B-FC5283D44AAA}" type="datetimeFigureOut">
               <a:rPr lang="he-IL" smtClean="0"/>
-              <a:t>ב'/תשרי/תשפ"א</a:t>
+              <a:t>ו'/תשרי/תשפ"א</a:t>
             </a:fld>
             <a:endParaRPr lang="he-IL"/>
           </a:p>
@@ -597,7 +605,7 @@
           <a:p>
             <a:fld id="{554CE385-AC8C-4CCE-A06B-FC5283D44AAA}" type="datetimeFigureOut">
               <a:rPr lang="he-IL" smtClean="0"/>
-              <a:t>ב'/תשרי/תשפ"א</a:t>
+              <a:t>ו'/תשרי/תשפ"א</a:t>
             </a:fld>
             <a:endParaRPr lang="he-IL"/>
           </a:p>
@@ -767,7 +775,7 @@
           <a:p>
             <a:fld id="{554CE385-AC8C-4CCE-A06B-FC5283D44AAA}" type="datetimeFigureOut">
               <a:rPr lang="he-IL" smtClean="0"/>
-              <a:t>ב'/תשרי/תשפ"א</a:t>
+              <a:t>ו'/תשרי/תשפ"א</a:t>
             </a:fld>
             <a:endParaRPr lang="he-IL"/>
           </a:p>
@@ -1013,7 +1021,7 @@
           <a:p>
             <a:fld id="{554CE385-AC8C-4CCE-A06B-FC5283D44AAA}" type="datetimeFigureOut">
               <a:rPr lang="he-IL" smtClean="0"/>
-              <a:t>ב'/תשרי/תשפ"א</a:t>
+              <a:t>ו'/תשרי/תשפ"א</a:t>
             </a:fld>
             <a:endParaRPr lang="he-IL"/>
           </a:p>
@@ -1245,7 +1253,7 @@
           <a:p>
             <a:fld id="{554CE385-AC8C-4CCE-A06B-FC5283D44AAA}" type="datetimeFigureOut">
               <a:rPr lang="he-IL" smtClean="0"/>
-              <a:t>ב'/תשרי/תשפ"א</a:t>
+              <a:t>ו'/תשרי/תשפ"א</a:t>
             </a:fld>
             <a:endParaRPr lang="he-IL"/>
           </a:p>
@@ -1612,7 +1620,7 @@
           <a:p>
             <a:fld id="{554CE385-AC8C-4CCE-A06B-FC5283D44AAA}" type="datetimeFigureOut">
               <a:rPr lang="he-IL" smtClean="0"/>
-              <a:t>ב'/תשרי/תשפ"א</a:t>
+              <a:t>ו'/תשרי/תשפ"א</a:t>
             </a:fld>
             <a:endParaRPr lang="he-IL"/>
           </a:p>
@@ -1730,7 +1738,7 @@
           <a:p>
             <a:fld id="{554CE385-AC8C-4CCE-A06B-FC5283D44AAA}" type="datetimeFigureOut">
               <a:rPr lang="he-IL" smtClean="0"/>
-              <a:t>ב'/תשרי/תשפ"א</a:t>
+              <a:t>ו'/תשרי/תשפ"א</a:t>
             </a:fld>
             <a:endParaRPr lang="he-IL"/>
           </a:p>
@@ -1825,7 +1833,7 @@
           <a:p>
             <a:fld id="{554CE385-AC8C-4CCE-A06B-FC5283D44AAA}" type="datetimeFigureOut">
               <a:rPr lang="he-IL" smtClean="0"/>
-              <a:t>ב'/תשרי/תשפ"א</a:t>
+              <a:t>ו'/תשרי/תשפ"א</a:t>
             </a:fld>
             <a:endParaRPr lang="he-IL"/>
           </a:p>
@@ -2102,7 +2110,7 @@
           <a:p>
             <a:fld id="{554CE385-AC8C-4CCE-A06B-FC5283D44AAA}" type="datetimeFigureOut">
               <a:rPr lang="he-IL" smtClean="0"/>
-              <a:t>ב'/תשרי/תשפ"א</a:t>
+              <a:t>ו'/תשרי/תשפ"א</a:t>
             </a:fld>
             <a:endParaRPr lang="he-IL"/>
           </a:p>
@@ -2355,7 +2363,7 @@
           <a:p>
             <a:fld id="{554CE385-AC8C-4CCE-A06B-FC5283D44AAA}" type="datetimeFigureOut">
               <a:rPr lang="he-IL" smtClean="0"/>
-              <a:t>ב'/תשרי/תשפ"א</a:t>
+              <a:t>ו'/תשרי/תשפ"א</a:t>
             </a:fld>
             <a:endParaRPr lang="he-IL"/>
           </a:p>
@@ -2568,7 +2576,7 @@
           <a:p>
             <a:fld id="{554CE385-AC8C-4CCE-A06B-FC5283D44AAA}" type="datetimeFigureOut">
               <a:rPr lang="he-IL" smtClean="0"/>
-              <a:t>ב'/תשרי/תשפ"א</a:t>
+              <a:t>ו'/תשרי/תשפ"א</a:t>
             </a:fld>
             <a:endParaRPr lang="he-IL"/>
           </a:p>
@@ -3036,8 +3044,103 @@
                 <a:latin typeface="Gisha" panose="020B0502040204020203" pitchFamily="34" charset="-79"/>
                 <a:cs typeface="Gisha" panose="020B0502040204020203" pitchFamily="34" charset="-79"/>
               </a:rPr>
-              <a:t>My Name Is </a:t>
-            </a:r>
+              <a:t>My Name Is Eric And I Play Thayne</a:t>
+            </a:r>
+            <a:endParaRPr lang="he-IL" sz="8000" b="1" dirty="0">
+              <a:ln w="28575">
+                <a:solidFill>
+                  <a:schemeClr val="bg1"/>
+                </a:solidFill>
+              </a:ln>
+              <a:latin typeface="Gisha" panose="020B0502040204020203" pitchFamily="34" charset="-79"/>
+              <a:cs typeface="Gisha" panose="020B0502040204020203" pitchFamily="34" charset="-79"/>
+            </a:endParaRPr>
+          </a:p>
+        </p:txBody>
+      </p:sp>
+    </p:spTree>
+    <p:extLst>
+      <p:ext uri="{BB962C8B-B14F-4D97-AF65-F5344CB8AC3E}">
+        <p14:creationId xmlns:p14="http://schemas.microsoft.com/office/powerpoint/2010/main" val="3002946028"/>
+      </p:ext>
+    </p:extLst>
+  </p:cSld>
+  <p:clrMapOvr>
+    <a:masterClrMapping/>
+  </p:clrMapOvr>
+</p:sld>
+</file>
+
+<file path=ppt/slides/slide10.xml><?xml version="1.0" encoding="utf-8"?>
+<p:sld xmlns:a="http://schemas.openxmlformats.org/drawingml/2006/main" xmlns:r="http://schemas.openxmlformats.org/officeDocument/2006/relationships" xmlns:p="http://schemas.openxmlformats.org/presentationml/2006/main">
+  <p:cSld>
+    <p:spTree>
+      <p:nvGrpSpPr>
+        <p:cNvPr id="1" name=""/>
+        <p:cNvGrpSpPr/>
+        <p:nvPr/>
+      </p:nvGrpSpPr>
+      <p:grpSpPr>
+        <a:xfrm>
+          <a:off x="0" y="0"/>
+          <a:ext cx="0" cy="0"/>
+          <a:chOff x="0" y="0"/>
+          <a:chExt cx="0" cy="0"/>
+        </a:xfrm>
+      </p:grpSpPr>
+      <p:pic>
+        <p:nvPicPr>
+          <p:cNvPr id="4" name="Picture 3"/>
+          <p:cNvPicPr>
+            <a:picLocks noChangeAspect="1"/>
+          </p:cNvPicPr>
+          <p:nvPr/>
+        </p:nvPicPr>
+        <p:blipFill>
+          <a:blip r:embed="rId2">
+            <a:extLst>
+              <a:ext uri="{28A0092B-C50C-407E-A947-70E740481C1C}">
+                <a14:useLocalDpi xmlns:a14="http://schemas.microsoft.com/office/drawing/2010/main" val="0"/>
+              </a:ext>
+            </a:extLst>
+          </a:blip>
+          <a:stretch>
+            <a:fillRect/>
+          </a:stretch>
+        </p:blipFill>
+        <p:spPr>
+          <a:xfrm>
+            <a:off x="2667000" y="0"/>
+            <a:ext cx="6858000" cy="6858000"/>
+          </a:xfrm>
+          <a:prstGeom prst="rect">
+            <a:avLst/>
+          </a:prstGeom>
+        </p:spPr>
+      </p:pic>
+      <p:sp>
+        <p:nvSpPr>
+          <p:cNvPr id="5" name="TextBox 4"/>
+          <p:cNvSpPr txBox="1"/>
+          <p:nvPr/>
+        </p:nvSpPr>
+        <p:spPr>
+          <a:xfrm>
+            <a:off x="2981609" y="1882423"/>
+            <a:ext cx="6228782" cy="3093154"/>
+          </a:xfrm>
+          <a:prstGeom prst="rect">
+            <a:avLst/>
+          </a:prstGeom>
+          <a:noFill/>
+        </p:spPr>
+        <p:txBody>
+          <a:bodyPr wrap="square" rtlCol="1">
+            <a:spAutoFit/>
+          </a:bodyPr>
+          <a:lstStyle/>
+          <a:p>
+            <a:pPr algn="ctr" rtl="0"/>
             <a:r>
               <a:rPr lang="en-US" sz="8000" b="1" dirty="0" smtClean="0">
                 <a:ln w="28575">
@@ -3048,10 +3151,13 @@
                 <a:latin typeface="Gisha" panose="020B0502040204020203" pitchFamily="34" charset="-79"/>
                 <a:cs typeface="Gisha" panose="020B0502040204020203" pitchFamily="34" charset="-79"/>
               </a:rPr>
-              <a:t>Eric And </a:t>
-            </a:r>
-            <a:r>
-              <a:rPr lang="en-US" sz="8000" b="1" dirty="0" smtClean="0">
+              <a:t>Hhhhaaa…</a:t>
+            </a:r>
+          </a:p>
+          <a:p>
+            <a:pPr algn="ctr" rtl="0"/>
+            <a:r>
+              <a:rPr lang="en-US" sz="11500" b="1" dirty="0" smtClean="0">
                 <a:ln w="28575">
                   <a:solidFill>
                     <a:schemeClr val="bg1"/>
@@ -3060,9 +3166,9 @@
                 <a:latin typeface="Gisha" panose="020B0502040204020203" pitchFamily="34" charset="-79"/>
                 <a:cs typeface="Gisha" panose="020B0502040204020203" pitchFamily="34" charset="-79"/>
               </a:rPr>
-              <a:t>I Play Thayne</a:t>
-            </a:r>
-            <a:endParaRPr lang="he-IL" sz="8000" b="1" dirty="0">
+              <a:t>Shit.</a:t>
+            </a:r>
+            <a:endParaRPr lang="he-IL" sz="11500" b="1" dirty="0">
               <a:ln w="28575">
                 <a:solidFill>
                   <a:schemeClr val="bg1"/>
@@ -3077,7 +3183,398 @@
     </p:spTree>
     <p:extLst>
       <p:ext uri="{BB962C8B-B14F-4D97-AF65-F5344CB8AC3E}">
-        <p14:creationId xmlns:p14="http://schemas.microsoft.com/office/powerpoint/2010/main" val="3002946028"/>
+        <p14:creationId xmlns:p14="http://schemas.microsoft.com/office/powerpoint/2010/main" val="1974055428"/>
+      </p:ext>
+    </p:extLst>
+  </p:cSld>
+  <p:clrMapOvr>
+    <a:masterClrMapping/>
+  </p:clrMapOvr>
+</p:sld>
+</file>
+
+<file path=ppt/slides/slide11.xml><?xml version="1.0" encoding="utf-8"?>
+<p:sld xmlns:a="http://schemas.openxmlformats.org/drawingml/2006/main" xmlns:r="http://schemas.openxmlformats.org/officeDocument/2006/relationships" xmlns:p="http://schemas.openxmlformats.org/presentationml/2006/main">
+  <p:cSld>
+    <p:spTree>
+      <p:nvGrpSpPr>
+        <p:cNvPr id="1" name=""/>
+        <p:cNvGrpSpPr/>
+        <p:nvPr/>
+      </p:nvGrpSpPr>
+      <p:grpSpPr>
+        <a:xfrm>
+          <a:off x="0" y="0"/>
+          <a:ext cx="0" cy="0"/>
+          <a:chOff x="0" y="0"/>
+          <a:chExt cx="0" cy="0"/>
+        </a:xfrm>
+      </p:grpSpPr>
+      <p:pic>
+        <p:nvPicPr>
+          <p:cNvPr id="4" name="Picture 3"/>
+          <p:cNvPicPr>
+            <a:picLocks noChangeAspect="1"/>
+          </p:cNvPicPr>
+          <p:nvPr/>
+        </p:nvPicPr>
+        <p:blipFill>
+          <a:blip r:embed="rId2">
+            <a:extLst>
+              <a:ext uri="{28A0092B-C50C-407E-A947-70E740481C1C}">
+                <a14:useLocalDpi xmlns:a14="http://schemas.microsoft.com/office/drawing/2010/main" val="0"/>
+              </a:ext>
+            </a:extLst>
+          </a:blip>
+          <a:stretch>
+            <a:fillRect/>
+          </a:stretch>
+        </p:blipFill>
+        <p:spPr>
+          <a:xfrm>
+            <a:off x="2667000" y="0"/>
+            <a:ext cx="6858000" cy="6858000"/>
+          </a:xfrm>
+          <a:prstGeom prst="rect">
+            <a:avLst/>
+          </a:prstGeom>
+        </p:spPr>
+      </p:pic>
+      <p:sp>
+        <p:nvSpPr>
+          <p:cNvPr id="5" name="TextBox 4"/>
+          <p:cNvSpPr txBox="1"/>
+          <p:nvPr/>
+        </p:nvSpPr>
+        <p:spPr>
+          <a:xfrm>
+            <a:off x="2878327" y="1905506"/>
+            <a:ext cx="6435346" cy="3046988"/>
+          </a:xfrm>
+          <a:prstGeom prst="rect">
+            <a:avLst/>
+          </a:prstGeom>
+          <a:noFill/>
+        </p:spPr>
+        <p:txBody>
+          <a:bodyPr wrap="square" rtlCol="1">
+            <a:spAutoFit/>
+          </a:bodyPr>
+          <a:lstStyle/>
+          <a:p>
+            <a:pPr algn="ctr" rtl="0"/>
+            <a:r>
+              <a:rPr lang="en-US" sz="9600" b="1" dirty="0" smtClean="0">
+                <a:ln w="28575">
+                  <a:solidFill>
+                    <a:schemeClr val="bg1"/>
+                  </a:solidFill>
+                </a:ln>
+                <a:latin typeface="Gisha" panose="020B0502040204020203" pitchFamily="34" charset="-79"/>
+                <a:cs typeface="Gisha" panose="020B0502040204020203" pitchFamily="34" charset="-79"/>
+              </a:rPr>
+              <a:t>Well </a:t>
+            </a:r>
+            <a:r>
+              <a:rPr lang="en-US" sz="9600" b="1" dirty="0" smtClean="0">
+                <a:ln w="28575">
+                  <a:solidFill>
+                    <a:schemeClr val="bg1"/>
+                  </a:solidFill>
+                </a:ln>
+                <a:latin typeface="Gisha" panose="020B0502040204020203" pitchFamily="34" charset="-79"/>
+                <a:cs typeface="Gisha" panose="020B0502040204020203" pitchFamily="34" charset="-79"/>
+              </a:rPr>
+              <a:t>son</a:t>
+            </a:r>
+            <a:br>
+              <a:rPr lang="en-US" sz="9600" b="1" dirty="0" smtClean="0">
+                <a:ln w="28575">
+                  <a:solidFill>
+                    <a:schemeClr val="bg1"/>
+                  </a:solidFill>
+                </a:ln>
+                <a:latin typeface="Gisha" panose="020B0502040204020203" pitchFamily="34" charset="-79"/>
+                <a:cs typeface="Gisha" panose="020B0502040204020203" pitchFamily="34" charset="-79"/>
+              </a:rPr>
+            </a:br>
+            <a:r>
+              <a:rPr lang="en-US" sz="9600" b="1" dirty="0" smtClean="0">
+                <a:ln w="28575">
+                  <a:solidFill>
+                    <a:schemeClr val="bg1"/>
+                  </a:solidFill>
+                </a:ln>
+                <a:latin typeface="Gisha" panose="020B0502040204020203" pitchFamily="34" charset="-79"/>
+                <a:cs typeface="Gisha" panose="020B0502040204020203" pitchFamily="34" charset="-79"/>
+              </a:rPr>
+              <a:t>of a </a:t>
+            </a:r>
+            <a:r>
+              <a:rPr lang="en-US" sz="9600" b="1" dirty="0" smtClean="0">
+                <a:ln w="28575">
+                  <a:solidFill>
+                    <a:schemeClr val="bg1"/>
+                  </a:solidFill>
+                </a:ln>
+                <a:latin typeface="Gisha" panose="020B0502040204020203" pitchFamily="34" charset="-79"/>
+                <a:cs typeface="Gisha" panose="020B0502040204020203" pitchFamily="34" charset="-79"/>
+              </a:rPr>
+              <a:t>bitch</a:t>
+            </a:r>
+            <a:endParaRPr lang="he-IL" sz="9600" b="1" dirty="0">
+              <a:ln w="28575">
+                <a:solidFill>
+                  <a:schemeClr val="bg1"/>
+                </a:solidFill>
+              </a:ln>
+              <a:latin typeface="Gisha" panose="020B0502040204020203" pitchFamily="34" charset="-79"/>
+              <a:cs typeface="Gisha" panose="020B0502040204020203" pitchFamily="34" charset="-79"/>
+            </a:endParaRPr>
+          </a:p>
+        </p:txBody>
+      </p:sp>
+    </p:spTree>
+    <p:extLst>
+      <p:ext uri="{BB962C8B-B14F-4D97-AF65-F5344CB8AC3E}">
+        <p14:creationId xmlns:p14="http://schemas.microsoft.com/office/powerpoint/2010/main" val="2825350850"/>
+      </p:ext>
+    </p:extLst>
+  </p:cSld>
+  <p:clrMapOvr>
+    <a:masterClrMapping/>
+  </p:clrMapOvr>
+</p:sld>
+</file>
+
+<file path=ppt/slides/slide12.xml><?xml version="1.0" encoding="utf-8"?>
+<p:sld xmlns:a="http://schemas.openxmlformats.org/drawingml/2006/main" xmlns:r="http://schemas.openxmlformats.org/officeDocument/2006/relationships" xmlns:p="http://schemas.openxmlformats.org/presentationml/2006/main">
+  <p:cSld>
+    <p:spTree>
+      <p:nvGrpSpPr>
+        <p:cNvPr id="1" name=""/>
+        <p:cNvGrpSpPr/>
+        <p:nvPr/>
+      </p:nvGrpSpPr>
+      <p:grpSpPr>
+        <a:xfrm>
+          <a:off x="0" y="0"/>
+          <a:ext cx="0" cy="0"/>
+          <a:chOff x="0" y="0"/>
+          <a:chExt cx="0" cy="0"/>
+        </a:xfrm>
+      </p:grpSpPr>
+      <p:pic>
+        <p:nvPicPr>
+          <p:cNvPr id="4" name="Picture 3"/>
+          <p:cNvPicPr>
+            <a:picLocks noChangeAspect="1"/>
+          </p:cNvPicPr>
+          <p:nvPr/>
+        </p:nvPicPr>
+        <p:blipFill>
+          <a:blip r:embed="rId2">
+            <a:extLst>
+              <a:ext uri="{28A0092B-C50C-407E-A947-70E740481C1C}">
+                <a14:useLocalDpi xmlns:a14="http://schemas.microsoft.com/office/drawing/2010/main" val="0"/>
+              </a:ext>
+            </a:extLst>
+          </a:blip>
+          <a:stretch>
+            <a:fillRect/>
+          </a:stretch>
+        </p:blipFill>
+        <p:spPr>
+          <a:xfrm>
+            <a:off x="2667000" y="0"/>
+            <a:ext cx="6858000" cy="6858000"/>
+          </a:xfrm>
+          <a:prstGeom prst="rect">
+            <a:avLst/>
+          </a:prstGeom>
+        </p:spPr>
+      </p:pic>
+      <p:sp>
+        <p:nvSpPr>
+          <p:cNvPr id="5" name="TextBox 4"/>
+          <p:cNvSpPr txBox="1"/>
+          <p:nvPr/>
+        </p:nvSpPr>
+        <p:spPr>
+          <a:xfrm>
+            <a:off x="2878327" y="1613118"/>
+            <a:ext cx="6435346" cy="3631763"/>
+          </a:xfrm>
+          <a:prstGeom prst="rect">
+            <a:avLst/>
+          </a:prstGeom>
+          <a:noFill/>
+        </p:spPr>
+        <p:txBody>
+          <a:bodyPr wrap="square" rtlCol="1">
+            <a:spAutoFit/>
+          </a:bodyPr>
+          <a:lstStyle/>
+          <a:p>
+            <a:pPr algn="ctr" rtl="0"/>
+            <a:r>
+              <a:rPr lang="en-US" sz="11500" b="1" dirty="0" smtClean="0">
+                <a:ln w="28575">
+                  <a:solidFill>
+                    <a:schemeClr val="bg1"/>
+                  </a:solidFill>
+                </a:ln>
+                <a:latin typeface="Gisha" panose="020B0502040204020203" pitchFamily="34" charset="-79"/>
+                <a:cs typeface="Gisha" panose="020B0502040204020203" pitchFamily="34" charset="-79"/>
+              </a:rPr>
+              <a:t>Son of</a:t>
+            </a:r>
+            <a:br>
+              <a:rPr lang="en-US" sz="11500" b="1" dirty="0" smtClean="0">
+                <a:ln w="28575">
+                  <a:solidFill>
+                    <a:schemeClr val="bg1"/>
+                  </a:solidFill>
+                </a:ln>
+                <a:latin typeface="Gisha" panose="020B0502040204020203" pitchFamily="34" charset="-79"/>
+                <a:cs typeface="Gisha" panose="020B0502040204020203" pitchFamily="34" charset="-79"/>
+              </a:rPr>
+            </a:br>
+            <a:r>
+              <a:rPr lang="en-US" sz="11500" b="1" dirty="0" smtClean="0">
+                <a:ln w="28575">
+                  <a:solidFill>
+                    <a:schemeClr val="bg1"/>
+                  </a:solidFill>
+                </a:ln>
+                <a:latin typeface="Gisha" panose="020B0502040204020203" pitchFamily="34" charset="-79"/>
+                <a:cs typeface="Gisha" panose="020B0502040204020203" pitchFamily="34" charset="-79"/>
+              </a:rPr>
+              <a:t>a dick</a:t>
+            </a:r>
+            <a:endParaRPr lang="he-IL" sz="11500" b="1" dirty="0">
+              <a:ln w="28575">
+                <a:solidFill>
+                  <a:schemeClr val="bg1"/>
+                </a:solidFill>
+              </a:ln>
+              <a:latin typeface="Gisha" panose="020B0502040204020203" pitchFamily="34" charset="-79"/>
+              <a:cs typeface="Gisha" panose="020B0502040204020203" pitchFamily="34" charset="-79"/>
+            </a:endParaRPr>
+          </a:p>
+        </p:txBody>
+      </p:sp>
+    </p:spTree>
+    <p:extLst>
+      <p:ext uri="{BB962C8B-B14F-4D97-AF65-F5344CB8AC3E}">
+        <p14:creationId xmlns:p14="http://schemas.microsoft.com/office/powerpoint/2010/main" val="1210602622"/>
+      </p:ext>
+    </p:extLst>
+  </p:cSld>
+  <p:clrMapOvr>
+    <a:masterClrMapping/>
+  </p:clrMapOvr>
+</p:sld>
+</file>
+
+<file path=ppt/slides/slide13.xml><?xml version="1.0" encoding="utf-8"?>
+<p:sld xmlns:a="http://schemas.openxmlformats.org/drawingml/2006/main" xmlns:r="http://schemas.openxmlformats.org/officeDocument/2006/relationships" xmlns:p="http://schemas.openxmlformats.org/presentationml/2006/main">
+  <p:cSld>
+    <p:spTree>
+      <p:nvGrpSpPr>
+        <p:cNvPr id="1" name=""/>
+        <p:cNvGrpSpPr/>
+        <p:nvPr/>
+      </p:nvGrpSpPr>
+      <p:grpSpPr>
+        <a:xfrm>
+          <a:off x="0" y="0"/>
+          <a:ext cx="0" cy="0"/>
+          <a:chOff x="0" y="0"/>
+          <a:chExt cx="0" cy="0"/>
+        </a:xfrm>
+      </p:grpSpPr>
+      <p:pic>
+        <p:nvPicPr>
+          <p:cNvPr id="4" name="Picture 3"/>
+          <p:cNvPicPr>
+            <a:picLocks noChangeAspect="1"/>
+          </p:cNvPicPr>
+          <p:nvPr/>
+        </p:nvPicPr>
+        <p:blipFill>
+          <a:blip r:embed="rId2">
+            <a:extLst>
+              <a:ext uri="{28A0092B-C50C-407E-A947-70E740481C1C}">
+                <a14:useLocalDpi xmlns:a14="http://schemas.microsoft.com/office/drawing/2010/main" val="0"/>
+              </a:ext>
+            </a:extLst>
+          </a:blip>
+          <a:stretch>
+            <a:fillRect/>
+          </a:stretch>
+        </p:blipFill>
+        <p:spPr>
+          <a:xfrm>
+            <a:off x="2667000" y="0"/>
+            <a:ext cx="6858000" cy="6858000"/>
+          </a:xfrm>
+          <a:prstGeom prst="rect">
+            <a:avLst/>
+          </a:prstGeom>
+        </p:spPr>
+      </p:pic>
+      <p:sp>
+        <p:nvSpPr>
+          <p:cNvPr id="5" name="TextBox 4"/>
+          <p:cNvSpPr txBox="1"/>
+          <p:nvPr/>
+        </p:nvSpPr>
+        <p:spPr>
+          <a:xfrm>
+            <a:off x="2981609" y="1613118"/>
+            <a:ext cx="6228782" cy="3631763"/>
+          </a:xfrm>
+          <a:prstGeom prst="rect">
+            <a:avLst/>
+          </a:prstGeom>
+          <a:noFill/>
+        </p:spPr>
+        <p:txBody>
+          <a:bodyPr wrap="square" rtlCol="1">
+            <a:spAutoFit/>
+          </a:bodyPr>
+          <a:lstStyle/>
+          <a:p>
+            <a:pPr algn="ctr" rtl="0"/>
+            <a:r>
+              <a:rPr lang="en-US" sz="11500" b="1" dirty="0" smtClean="0">
+                <a:ln w="28575">
+                  <a:solidFill>
+                    <a:schemeClr val="bg1"/>
+                  </a:solidFill>
+                </a:ln>
+                <a:latin typeface="Gisha" panose="020B0502040204020203" pitchFamily="34" charset="-79"/>
+                <a:cs typeface="Gisha" panose="020B0502040204020203" pitchFamily="34" charset="-79"/>
+              </a:rPr>
+              <a:t>You bastard</a:t>
+            </a:r>
+            <a:endParaRPr lang="he-IL" sz="11500" b="1" dirty="0">
+              <a:ln w="28575">
+                <a:solidFill>
+                  <a:schemeClr val="bg1"/>
+                </a:solidFill>
+              </a:ln>
+              <a:latin typeface="Gisha" panose="020B0502040204020203" pitchFamily="34" charset="-79"/>
+              <a:cs typeface="Gisha" panose="020B0502040204020203" pitchFamily="34" charset="-79"/>
+            </a:endParaRPr>
+          </a:p>
+        </p:txBody>
+      </p:sp>
+    </p:spTree>
+    <p:extLst>
+      <p:ext uri="{BB962C8B-B14F-4D97-AF65-F5344CB8AC3E}">
+        <p14:creationId xmlns:p14="http://schemas.microsoft.com/office/powerpoint/2010/main" val="3125191206"/>
       </p:ext>
     </p:extLst>
   </p:cSld>
@@ -3167,43 +3664,7 @@
                 <a:latin typeface="Gisha" panose="020B0502040204020203" pitchFamily="34" charset="-79"/>
                 <a:cs typeface="Gisha" panose="020B0502040204020203" pitchFamily="34" charset="-79"/>
               </a:rPr>
-              <a:t>My Name Is </a:t>
-            </a:r>
-            <a:r>
-              <a:rPr lang="en-US" sz="8000" b="1" dirty="0" smtClean="0">
-                <a:ln w="28575">
-                  <a:solidFill>
-                    <a:schemeClr val="bg1"/>
-                  </a:solidFill>
-                </a:ln>
-                <a:latin typeface="Gisha" panose="020B0502040204020203" pitchFamily="34" charset="-79"/>
-                <a:cs typeface="Gisha" panose="020B0502040204020203" pitchFamily="34" charset="-79"/>
-              </a:rPr>
-              <a:t>Kelsy And </a:t>
-            </a:r>
-            <a:r>
-              <a:rPr lang="en-US" sz="8000" b="1" dirty="0" smtClean="0">
-                <a:ln w="28575">
-                  <a:solidFill>
-                    <a:schemeClr val="bg1"/>
-                  </a:solidFill>
-                </a:ln>
-                <a:latin typeface="Gisha" panose="020B0502040204020203" pitchFamily="34" charset="-79"/>
-                <a:cs typeface="Gisha" panose="020B0502040204020203" pitchFamily="34" charset="-79"/>
-              </a:rPr>
-              <a:t>I Play </a:t>
-            </a:r>
-            <a:r>
-              <a:rPr lang="en-US" sz="8000" b="1" dirty="0" smtClean="0">
-                <a:ln w="28575">
-                  <a:solidFill>
-                    <a:schemeClr val="bg1"/>
-                  </a:solidFill>
-                </a:ln>
-                <a:latin typeface="Gisha" panose="020B0502040204020203" pitchFamily="34" charset="-79"/>
-                <a:cs typeface="Gisha" panose="020B0502040204020203" pitchFamily="34" charset="-79"/>
-              </a:rPr>
-              <a:t>Kirin</a:t>
+              <a:t>My Name Is Kelsy And I Play Kirin</a:t>
             </a:r>
             <a:endParaRPr lang="he-IL" sz="8000" b="1" dirty="0">
               <a:ln w="28575">
@@ -3310,31 +3771,7 @@
                 <a:latin typeface="Gisha" panose="020B0502040204020203" pitchFamily="34" charset="-79"/>
                 <a:cs typeface="Gisha" panose="020B0502040204020203" pitchFamily="34" charset="-79"/>
               </a:rPr>
-              <a:t>My Name Is </a:t>
-            </a:r>
-            <a:r>
-              <a:rPr lang="en-US" sz="8000" b="1" dirty="0" smtClean="0">
-                <a:ln w="28575">
-                  <a:solidFill>
-                    <a:schemeClr val="bg1"/>
-                  </a:solidFill>
-                </a:ln>
-                <a:latin typeface="Gisha" panose="020B0502040204020203" pitchFamily="34" charset="-79"/>
-                <a:cs typeface="Gisha" panose="020B0502040204020203" pitchFamily="34" charset="-79"/>
-              </a:rPr>
-              <a:t>Spencer And </a:t>
-            </a:r>
-            <a:r>
-              <a:rPr lang="en-US" sz="8000" b="1" dirty="0" smtClean="0">
-                <a:ln w="28575">
-                  <a:solidFill>
-                    <a:schemeClr val="bg1"/>
-                  </a:solidFill>
-                </a:ln>
-                <a:latin typeface="Gisha" panose="020B0502040204020203" pitchFamily="34" charset="-79"/>
-                <a:cs typeface="Gisha" panose="020B0502040204020203" pitchFamily="34" charset="-79"/>
-              </a:rPr>
-              <a:t>I Play </a:t>
+              <a:t>My Name Is Spencer And I Play </a:t>
             </a:r>
             <a:r>
               <a:rPr lang="en-US" sz="8000" b="1" dirty="0" err="1" smtClean="0">
@@ -3453,43 +3890,7 @@
                 <a:latin typeface="Gisha" panose="020B0502040204020203" pitchFamily="34" charset="-79"/>
                 <a:cs typeface="Gisha" panose="020B0502040204020203" pitchFamily="34" charset="-79"/>
               </a:rPr>
-              <a:t>My Name Is </a:t>
-            </a:r>
-            <a:r>
-              <a:rPr lang="en-US" sz="6600" b="1" dirty="0" smtClean="0">
-                <a:ln w="28575">
-                  <a:solidFill>
-                    <a:schemeClr val="bg1"/>
-                  </a:solidFill>
-                </a:ln>
-                <a:latin typeface="Gisha" panose="020B0502040204020203" pitchFamily="34" charset="-79"/>
-                <a:cs typeface="Gisha" panose="020B0502040204020203" pitchFamily="34" charset="-79"/>
-              </a:rPr>
-              <a:t>Alex And </a:t>
-            </a:r>
-            <a:r>
-              <a:rPr lang="en-US" sz="6600" b="1" dirty="0" smtClean="0">
-                <a:ln w="28575">
-                  <a:solidFill>
-                    <a:schemeClr val="bg1"/>
-                  </a:solidFill>
-                </a:ln>
-                <a:latin typeface="Gisha" panose="020B0502040204020203" pitchFamily="34" charset="-79"/>
-                <a:cs typeface="Gisha" panose="020B0502040204020203" pitchFamily="34" charset="-79"/>
-              </a:rPr>
-              <a:t>I Play </a:t>
-            </a:r>
-            <a:r>
-              <a:rPr lang="en-US" sz="6600" b="1" dirty="0" smtClean="0">
-                <a:ln w="28575">
-                  <a:solidFill>
-                    <a:schemeClr val="bg1"/>
-                  </a:solidFill>
-                </a:ln>
-                <a:latin typeface="Gisha" panose="020B0502040204020203" pitchFamily="34" charset="-79"/>
-                <a:cs typeface="Gisha" panose="020B0502040204020203" pitchFamily="34" charset="-79"/>
-              </a:rPr>
-              <a:t>Chuck “The Midnight” Hondooo</a:t>
+              <a:t>My Name Is Alex And I Play Chuck “The Midnight” Hondooo</a:t>
             </a:r>
             <a:endParaRPr lang="he-IL" sz="6600" b="1" dirty="0">
               <a:ln w="28575">
@@ -3517,6 +3918,235 @@
 </file>
 
 <file path=ppt/slides/slide5.xml><?xml version="1.0" encoding="utf-8"?>
+<p:sld xmlns:a="http://schemas.openxmlformats.org/drawingml/2006/main" xmlns:r="http://schemas.openxmlformats.org/officeDocument/2006/relationships" xmlns:p="http://schemas.openxmlformats.org/presentationml/2006/main">
+  <p:cSld>
+    <p:spTree>
+      <p:nvGrpSpPr>
+        <p:cNvPr id="1" name=""/>
+        <p:cNvGrpSpPr/>
+        <p:nvPr/>
+      </p:nvGrpSpPr>
+      <p:grpSpPr>
+        <a:xfrm>
+          <a:off x="0" y="0"/>
+          <a:ext cx="0" cy="0"/>
+          <a:chOff x="0" y="0"/>
+          <a:chExt cx="0" cy="0"/>
+        </a:xfrm>
+      </p:grpSpPr>
+      <p:pic>
+        <p:nvPicPr>
+          <p:cNvPr id="2" name="Picture 1"/>
+          <p:cNvPicPr>
+            <a:picLocks noChangeAspect="1"/>
+          </p:cNvPicPr>
+          <p:nvPr/>
+        </p:nvPicPr>
+        <p:blipFill rotWithShape="1">
+          <a:blip r:embed="rId2">
+            <a:extLst>
+              <a:ext uri="{28A0092B-C50C-407E-A947-70E740481C1C}">
+                <a14:useLocalDpi xmlns:a14="http://schemas.microsoft.com/office/drawing/2010/main" val="0"/>
+              </a:ext>
+            </a:extLst>
+          </a:blip>
+          <a:srcRect l="19649" r="10789"/>
+          <a:stretch/>
+        </p:blipFill>
+        <p:spPr>
+          <a:xfrm>
+            <a:off x="2667000" y="0"/>
+            <a:ext cx="6858000" cy="6858000"/>
+          </a:xfrm>
+          <a:prstGeom prst="rect">
+            <a:avLst/>
+          </a:prstGeom>
+        </p:spPr>
+      </p:pic>
+      <p:sp>
+        <p:nvSpPr>
+          <p:cNvPr id="5" name="TextBox 4"/>
+          <p:cNvSpPr txBox="1"/>
+          <p:nvPr/>
+        </p:nvSpPr>
+        <p:spPr>
+          <a:xfrm>
+            <a:off x="2878327" y="2274838"/>
+            <a:ext cx="6435346" cy="2308324"/>
+          </a:xfrm>
+          <a:prstGeom prst="rect">
+            <a:avLst/>
+          </a:prstGeom>
+          <a:noFill/>
+        </p:spPr>
+        <p:txBody>
+          <a:bodyPr wrap="square" rtlCol="1">
+            <a:spAutoFit/>
+          </a:bodyPr>
+          <a:lstStyle/>
+          <a:p>
+            <a:pPr algn="ctr" rtl="0"/>
+            <a:r>
+              <a:rPr lang="en-US" sz="7200" b="1" dirty="0" smtClean="0">
+                <a:ln w="28575">
+                  <a:solidFill>
+                    <a:schemeClr val="bg1"/>
+                  </a:solidFill>
+                </a:ln>
+                <a:latin typeface="Gisha" panose="020B0502040204020203" pitchFamily="34" charset="-79"/>
+                <a:cs typeface="Gisha" panose="020B0502040204020203" pitchFamily="34" charset="-79"/>
+              </a:rPr>
+              <a:t>Last But Not Least – Joshua</a:t>
+            </a:r>
+            <a:endParaRPr lang="he-IL" sz="7200" b="1" dirty="0">
+              <a:ln w="28575">
+                <a:solidFill>
+                  <a:schemeClr val="bg1"/>
+                </a:solidFill>
+              </a:ln>
+              <a:latin typeface="Gisha" panose="020B0502040204020203" pitchFamily="34" charset="-79"/>
+              <a:cs typeface="Gisha" panose="020B0502040204020203" pitchFamily="34" charset="-79"/>
+            </a:endParaRPr>
+          </a:p>
+        </p:txBody>
+      </p:sp>
+    </p:spTree>
+    <p:extLst>
+      <p:ext uri="{BB962C8B-B14F-4D97-AF65-F5344CB8AC3E}">
+        <p14:creationId xmlns:p14="http://schemas.microsoft.com/office/powerpoint/2010/main" val="1914949874"/>
+      </p:ext>
+    </p:extLst>
+  </p:cSld>
+  <p:clrMapOvr>
+    <a:masterClrMapping/>
+  </p:clrMapOvr>
+</p:sld>
+</file>
+
+<file path=ppt/slides/slide6.xml><?xml version="1.0" encoding="utf-8"?>
+<p:sld xmlns:a="http://schemas.openxmlformats.org/drawingml/2006/main" xmlns:r="http://schemas.openxmlformats.org/officeDocument/2006/relationships" xmlns:p="http://schemas.openxmlformats.org/presentationml/2006/main">
+  <p:cSld>
+    <p:spTree>
+      <p:nvGrpSpPr>
+        <p:cNvPr id="1" name=""/>
+        <p:cNvGrpSpPr/>
+        <p:nvPr/>
+      </p:nvGrpSpPr>
+      <p:grpSpPr>
+        <a:xfrm>
+          <a:off x="0" y="0"/>
+          <a:ext cx="0" cy="0"/>
+          <a:chOff x="0" y="0"/>
+          <a:chExt cx="0" cy="0"/>
+        </a:xfrm>
+      </p:grpSpPr>
+      <p:pic>
+        <p:nvPicPr>
+          <p:cNvPr id="6" name="Picture 5"/>
+          <p:cNvPicPr>
+            <a:picLocks noChangeAspect="1"/>
+          </p:cNvPicPr>
+          <p:nvPr/>
+        </p:nvPicPr>
+        <p:blipFill>
+          <a:blip r:embed="rId2">
+            <a:extLst>
+              <a:ext uri="{28A0092B-C50C-407E-A947-70E740481C1C}">
+                <a14:useLocalDpi xmlns:a14="http://schemas.microsoft.com/office/drawing/2010/main" val="0"/>
+              </a:ext>
+            </a:extLst>
+          </a:blip>
+          <a:stretch>
+            <a:fillRect/>
+          </a:stretch>
+        </p:blipFill>
+        <p:spPr>
+          <a:xfrm>
+            <a:off x="2667000" y="0"/>
+            <a:ext cx="6858000" cy="6858000"/>
+          </a:xfrm>
+          <a:prstGeom prst="rect">
+            <a:avLst/>
+          </a:prstGeom>
+          <a:noFill/>
+        </p:spPr>
+      </p:pic>
+      <p:sp>
+        <p:nvSpPr>
+          <p:cNvPr id="5" name="TextBox 4"/>
+          <p:cNvSpPr txBox="1"/>
+          <p:nvPr/>
+        </p:nvSpPr>
+        <p:spPr>
+          <a:xfrm>
+            <a:off x="2878327" y="2151727"/>
+            <a:ext cx="6435346" cy="2554545"/>
+          </a:xfrm>
+          <a:prstGeom prst="rect">
+            <a:avLst/>
+          </a:prstGeom>
+          <a:noFill/>
+        </p:spPr>
+        <p:txBody>
+          <a:bodyPr wrap="square" rtlCol="1">
+            <a:spAutoFit/>
+          </a:bodyPr>
+          <a:lstStyle/>
+          <a:p>
+            <a:pPr algn="ctr" rtl="0"/>
+            <a:r>
+              <a:rPr lang="en-US" sz="8000" b="1" dirty="0" smtClean="0">
+                <a:ln w="28575">
+                  <a:solidFill>
+                    <a:schemeClr val="bg1"/>
+                  </a:solidFill>
+                </a:ln>
+                <a:latin typeface="Gisha" panose="020B0502040204020203" pitchFamily="34" charset="-79"/>
+                <a:cs typeface="Gisha" panose="020B0502040204020203" pitchFamily="34" charset="-79"/>
+              </a:rPr>
+              <a:t>Hoowee</a:t>
+            </a:r>
+          </a:p>
+          <a:p>
+            <a:pPr algn="ctr" rtl="0"/>
+            <a:r>
+              <a:rPr lang="en-US" sz="8000" b="1" dirty="0" smtClean="0">
+                <a:ln w="28575">
+                  <a:solidFill>
+                    <a:schemeClr val="bg1"/>
+                  </a:solidFill>
+                </a:ln>
+                <a:latin typeface="Gisha" panose="020B0502040204020203" pitchFamily="34" charset="-79"/>
+                <a:cs typeface="Gisha" panose="020B0502040204020203" pitchFamily="34" charset="-79"/>
+              </a:rPr>
+              <a:t>Damn Girl</a:t>
+            </a:r>
+            <a:endParaRPr lang="he-IL" sz="8000" b="1" dirty="0">
+              <a:ln w="28575">
+                <a:solidFill>
+                  <a:schemeClr val="bg1"/>
+                </a:solidFill>
+              </a:ln>
+              <a:latin typeface="Gisha" panose="020B0502040204020203" pitchFamily="34" charset="-79"/>
+              <a:cs typeface="Gisha" panose="020B0502040204020203" pitchFamily="34" charset="-79"/>
+            </a:endParaRPr>
+          </a:p>
+        </p:txBody>
+      </p:sp>
+    </p:spTree>
+    <p:extLst>
+      <p:ext uri="{BB962C8B-B14F-4D97-AF65-F5344CB8AC3E}">
+        <p14:creationId xmlns:p14="http://schemas.microsoft.com/office/powerpoint/2010/main" val="1802296492"/>
+      </p:ext>
+    </p:extLst>
+  </p:cSld>
+  <p:clrMapOvr>
+    <a:masterClrMapping/>
+  </p:clrMapOvr>
+</p:sld>
+</file>
+
+<file path=ppt/slides/slide7.xml><?xml version="1.0" encoding="utf-8"?>
 <p:sld xmlns:a="http://schemas.openxmlformats.org/drawingml/2006/main" xmlns:r="http://schemas.openxmlformats.org/officeDocument/2006/relationships" xmlns:p="http://schemas.openxmlformats.org/presentationml/2006/main">
   <p:cSld>
     <p:spTree>
@@ -3561,7 +4191,6 @@
           <a:prstGeom prst="rect">
             <a:avLst/>
           </a:prstGeom>
-          <a:noFill/>
         </p:spPr>
       </p:pic>
       <p:sp>
@@ -3572,8 +4201,8 @@
         </p:nvSpPr>
         <p:spPr>
           <a:xfrm>
-            <a:off x="2878327" y="2274838"/>
-            <a:ext cx="6435346" cy="2308324"/>
+            <a:off x="2878327" y="2644170"/>
+            <a:ext cx="6435346" cy="1569660"/>
           </a:xfrm>
           <a:prstGeom prst="rect">
             <a:avLst/>
@@ -3588,7 +4217,7 @@
           <a:p>
             <a:pPr algn="ctr" rtl="0"/>
             <a:r>
-              <a:rPr lang="en-US" sz="7200" b="1" dirty="0" smtClean="0">
+              <a:rPr lang="en-US" sz="9600" b="1" dirty="0" smtClean="0">
                 <a:ln w="28575">
                   <a:solidFill>
                     <a:schemeClr val="bg1"/>
@@ -3597,9 +4226,9 @@
                 <a:latin typeface="Gisha" panose="020B0502040204020203" pitchFamily="34" charset="-79"/>
                 <a:cs typeface="Gisha" panose="020B0502040204020203" pitchFamily="34" charset="-79"/>
               </a:rPr>
-              <a:t>Last But Not Least – Joshua</a:t>
-            </a:r>
-            <a:endParaRPr lang="he-IL" sz="7200" b="1" dirty="0">
+              <a:t>Oh My</a:t>
+            </a:r>
+            <a:endParaRPr lang="he-IL" sz="9600" b="1" dirty="0">
               <a:ln w="28575">
                 <a:solidFill>
                   <a:schemeClr val="bg1"/>
@@ -3614,7 +4243,294 @@
     </p:spTree>
     <p:extLst>
       <p:ext uri="{BB962C8B-B14F-4D97-AF65-F5344CB8AC3E}">
-        <p14:creationId xmlns:p14="http://schemas.microsoft.com/office/powerpoint/2010/main" val="1914949874"/>
+        <p14:creationId xmlns:p14="http://schemas.microsoft.com/office/powerpoint/2010/main" val="4266081805"/>
+      </p:ext>
+    </p:extLst>
+  </p:cSld>
+  <p:clrMapOvr>
+    <a:masterClrMapping/>
+  </p:clrMapOvr>
+</p:sld>
+</file>
+
+<file path=ppt/slides/slide8.xml><?xml version="1.0" encoding="utf-8"?>
+<p:sld xmlns:a="http://schemas.openxmlformats.org/drawingml/2006/main" xmlns:r="http://schemas.openxmlformats.org/officeDocument/2006/relationships" xmlns:p="http://schemas.openxmlformats.org/presentationml/2006/main">
+  <p:cSld>
+    <p:spTree>
+      <p:nvGrpSpPr>
+        <p:cNvPr id="1" name=""/>
+        <p:cNvGrpSpPr/>
+        <p:nvPr/>
+      </p:nvGrpSpPr>
+      <p:grpSpPr>
+        <a:xfrm>
+          <a:off x="0" y="0"/>
+          <a:ext cx="0" cy="0"/>
+          <a:chOff x="0" y="0"/>
+          <a:chExt cx="0" cy="0"/>
+        </a:xfrm>
+      </p:grpSpPr>
+      <p:pic>
+        <p:nvPicPr>
+          <p:cNvPr id="7" name="Picture 6"/>
+          <p:cNvPicPr>
+            <a:picLocks noChangeAspect="1"/>
+          </p:cNvPicPr>
+          <p:nvPr/>
+        </p:nvPicPr>
+        <p:blipFill rotWithShape="1">
+          <a:blip r:embed="rId2">
+            <a:extLst>
+              <a:ext uri="{28A0092B-C50C-407E-A947-70E740481C1C}">
+                <a14:useLocalDpi xmlns:a14="http://schemas.microsoft.com/office/drawing/2010/main" val="0"/>
+              </a:ext>
+            </a:extLst>
+          </a:blip>
+          <a:srcRect l="19649" r="10789"/>
+          <a:stretch/>
+        </p:blipFill>
+        <p:spPr>
+          <a:xfrm>
+            <a:off x="2666999" y="0"/>
+            <a:ext cx="6858000" cy="6858000"/>
+          </a:xfrm>
+          <a:prstGeom prst="rect">
+            <a:avLst/>
+          </a:prstGeom>
+        </p:spPr>
+      </p:pic>
+      <p:sp>
+        <p:nvSpPr>
+          <p:cNvPr id="5" name="TextBox 4"/>
+          <p:cNvSpPr txBox="1"/>
+          <p:nvPr/>
+        </p:nvSpPr>
+        <p:spPr>
+          <a:xfrm>
+            <a:off x="2914737" y="1536174"/>
+            <a:ext cx="6362523" cy="3785652"/>
+          </a:xfrm>
+          <a:prstGeom prst="rect">
+            <a:avLst/>
+          </a:prstGeom>
+          <a:noFill/>
+        </p:spPr>
+        <p:txBody>
+          <a:bodyPr wrap="square" rtlCol="1">
+            <a:spAutoFit/>
+          </a:bodyPr>
+          <a:lstStyle/>
+          <a:p>
+            <a:pPr algn="ctr" rtl="0"/>
+            <a:r>
+              <a:rPr lang="en-US" sz="8000" b="1" dirty="0" smtClean="0">
+                <a:ln w="28575">
+                  <a:solidFill>
+                    <a:schemeClr val="bg1"/>
+                  </a:solidFill>
+                </a:ln>
+                <a:latin typeface="Gisha" panose="020B0502040204020203" pitchFamily="34" charset="-79"/>
+                <a:cs typeface="Gisha" panose="020B0502040204020203" pitchFamily="34" charset="-79"/>
+              </a:rPr>
+              <a:t>Can we</a:t>
+            </a:r>
+            <a:br>
+              <a:rPr lang="en-US" sz="8000" b="1" dirty="0" smtClean="0">
+                <a:ln w="28575">
+                  <a:solidFill>
+                    <a:schemeClr val="bg1"/>
+                  </a:solidFill>
+                </a:ln>
+                <a:latin typeface="Gisha" panose="020B0502040204020203" pitchFamily="34" charset="-79"/>
+                <a:cs typeface="Gisha" panose="020B0502040204020203" pitchFamily="34" charset="-79"/>
+              </a:rPr>
+            </a:br>
+            <a:r>
+              <a:rPr lang="en-US" sz="8000" b="1" dirty="0" smtClean="0">
+                <a:ln w="28575">
+                  <a:solidFill>
+                    <a:schemeClr val="bg1"/>
+                  </a:solidFill>
+                </a:ln>
+                <a:latin typeface="Gisha" panose="020B0502040204020203" pitchFamily="34" charset="-79"/>
+                <a:cs typeface="Gisha" panose="020B0502040204020203" pitchFamily="34" charset="-79"/>
+              </a:rPr>
+              <a:t>end this</a:t>
+            </a:r>
+            <a:br>
+              <a:rPr lang="en-US" sz="8000" b="1" dirty="0" smtClean="0">
+                <a:ln w="28575">
+                  <a:solidFill>
+                    <a:schemeClr val="bg1"/>
+                  </a:solidFill>
+                </a:ln>
+                <a:latin typeface="Gisha" panose="020B0502040204020203" pitchFamily="34" charset="-79"/>
+                <a:cs typeface="Gisha" panose="020B0502040204020203" pitchFamily="34" charset="-79"/>
+              </a:rPr>
+            </a:br>
+            <a:r>
+              <a:rPr lang="en-US" sz="8000" b="1" dirty="0" smtClean="0">
+                <a:ln w="28575">
+                  <a:solidFill>
+                    <a:schemeClr val="bg1"/>
+                  </a:solidFill>
+                </a:ln>
+                <a:latin typeface="Gisha" panose="020B0502040204020203" pitchFamily="34" charset="-79"/>
+                <a:cs typeface="Gisha" panose="020B0502040204020203" pitchFamily="34" charset="-79"/>
+              </a:rPr>
+              <a:t>conversation</a:t>
+            </a:r>
+          </a:p>
+        </p:txBody>
+      </p:sp>
+    </p:spTree>
+    <p:extLst>
+      <p:ext uri="{BB962C8B-B14F-4D97-AF65-F5344CB8AC3E}">
+        <p14:creationId xmlns:p14="http://schemas.microsoft.com/office/powerpoint/2010/main" val="670492160"/>
+      </p:ext>
+    </p:extLst>
+  </p:cSld>
+  <p:clrMapOvr>
+    <a:masterClrMapping/>
+  </p:clrMapOvr>
+</p:sld>
+</file>
+
+<file path=ppt/slides/slide9.xml><?xml version="1.0" encoding="utf-8"?>
+<p:sld xmlns:a="http://schemas.openxmlformats.org/drawingml/2006/main" xmlns:r="http://schemas.openxmlformats.org/officeDocument/2006/relationships" xmlns:p="http://schemas.openxmlformats.org/presentationml/2006/main">
+  <p:cSld>
+    <p:spTree>
+      <p:nvGrpSpPr>
+        <p:cNvPr id="1" name=""/>
+        <p:cNvGrpSpPr/>
+        <p:nvPr/>
+      </p:nvGrpSpPr>
+      <p:grpSpPr>
+        <a:xfrm>
+          <a:off x="0" y="0"/>
+          <a:ext cx="0" cy="0"/>
+          <a:chOff x="0" y="0"/>
+          <a:chExt cx="0" cy="0"/>
+        </a:xfrm>
+      </p:grpSpPr>
+      <p:pic>
+        <p:nvPicPr>
+          <p:cNvPr id="4" name="Picture 3"/>
+          <p:cNvPicPr>
+            <a:picLocks noChangeAspect="1"/>
+          </p:cNvPicPr>
+          <p:nvPr/>
+        </p:nvPicPr>
+        <p:blipFill>
+          <a:blip r:embed="rId2">
+            <a:extLst>
+              <a:ext uri="{28A0092B-C50C-407E-A947-70E740481C1C}">
+                <a14:useLocalDpi xmlns:a14="http://schemas.microsoft.com/office/drawing/2010/main" val="0"/>
+              </a:ext>
+            </a:extLst>
+          </a:blip>
+          <a:stretch>
+            <a:fillRect/>
+          </a:stretch>
+        </p:blipFill>
+        <p:spPr>
+          <a:xfrm>
+            <a:off x="2667000" y="0"/>
+            <a:ext cx="6858000" cy="6858000"/>
+          </a:xfrm>
+          <a:prstGeom prst="rect">
+            <a:avLst/>
+          </a:prstGeom>
+        </p:spPr>
+      </p:pic>
+      <p:sp>
+        <p:nvSpPr>
+          <p:cNvPr id="5" name="TextBox 4"/>
+          <p:cNvSpPr txBox="1"/>
+          <p:nvPr/>
+        </p:nvSpPr>
+        <p:spPr>
+          <a:xfrm>
+            <a:off x="3001174" y="1536174"/>
+            <a:ext cx="6189651" cy="3785652"/>
+          </a:xfrm>
+          <a:prstGeom prst="rect">
+            <a:avLst/>
+          </a:prstGeom>
+          <a:noFill/>
+        </p:spPr>
+        <p:txBody>
+          <a:bodyPr wrap="square" rtlCol="1">
+            <a:spAutoFit/>
+          </a:bodyPr>
+          <a:lstStyle/>
+          <a:p>
+            <a:pPr algn="ctr" rtl="0"/>
+            <a:r>
+              <a:rPr lang="en-US" sz="8000" b="1" dirty="0" smtClean="0">
+                <a:ln w="28575">
+                  <a:solidFill>
+                    <a:schemeClr val="bg1"/>
+                  </a:solidFill>
+                </a:ln>
+                <a:latin typeface="Gisha" panose="020B0502040204020203" pitchFamily="34" charset="-79"/>
+                <a:cs typeface="Gisha" panose="020B0502040204020203" pitchFamily="34" charset="-79"/>
+              </a:rPr>
+              <a:t>I do what’s</a:t>
+            </a:r>
+            <a:br>
+              <a:rPr lang="en-US" sz="8000" b="1" dirty="0" smtClean="0">
+                <a:ln w="28575">
+                  <a:solidFill>
+                    <a:schemeClr val="bg1"/>
+                  </a:solidFill>
+                </a:ln>
+                <a:latin typeface="Gisha" panose="020B0502040204020203" pitchFamily="34" charset="-79"/>
+                <a:cs typeface="Gisha" panose="020B0502040204020203" pitchFamily="34" charset="-79"/>
+              </a:rPr>
+            </a:br>
+            <a:r>
+              <a:rPr lang="en-US" sz="8000" b="1" dirty="0" smtClean="0">
+                <a:ln w="28575">
+                  <a:solidFill>
+                    <a:schemeClr val="bg1"/>
+                  </a:solidFill>
+                </a:ln>
+                <a:latin typeface="Gisha" panose="020B0502040204020203" pitchFamily="34" charset="-79"/>
+                <a:cs typeface="Gisha" panose="020B0502040204020203" pitchFamily="34" charset="-79"/>
+              </a:rPr>
+              <a:t>familiar and</a:t>
+            </a:r>
+            <a:br>
+              <a:rPr lang="en-US" sz="8000" b="1" dirty="0" smtClean="0">
+                <a:ln w="28575">
+                  <a:solidFill>
+                    <a:schemeClr val="bg1"/>
+                  </a:solidFill>
+                </a:ln>
+                <a:latin typeface="Gisha" panose="020B0502040204020203" pitchFamily="34" charset="-79"/>
+                <a:cs typeface="Gisha" panose="020B0502040204020203" pitchFamily="34" charset="-79"/>
+              </a:rPr>
+            </a:br>
+            <a:r>
+              <a:rPr lang="en-US" sz="8000" b="1" dirty="0" smtClean="0">
+                <a:ln w="28575">
+                  <a:solidFill>
+                    <a:schemeClr val="bg1"/>
+                  </a:solidFill>
+                </a:ln>
+                <a:latin typeface="Gisha" panose="020B0502040204020203" pitchFamily="34" charset="-79"/>
+                <a:cs typeface="Gisha" panose="020B0502040204020203" pitchFamily="34" charset="-79"/>
+              </a:rPr>
+              <a:t>I stab him</a:t>
+            </a:r>
+          </a:p>
+        </p:txBody>
+      </p:sp>
+    </p:spTree>
+    <p:extLst>
+      <p:ext uri="{BB962C8B-B14F-4D97-AF65-F5344CB8AC3E}">
+        <p14:creationId xmlns:p14="http://schemas.microsoft.com/office/powerpoint/2010/main" val="2143698838"/>
       </p:ext>
     </p:extLst>
   </p:cSld>

</xml_diff>